<commit_message>
slight edits on parsers.pptx
</commit_message>
<xml_diff>
--- a/samples/kast/parsers.pptx
+++ b/samples/kast/parsers.pptx
@@ -122,7 +122,7 @@
   </p:defaultTextStyle>
   <p:extLst>
     <p:ext uri="{EFAFB233-063F-42B5-8137-9DF3F51BA10A}">
-      <p15:sldGuideLst xmlns:p15="http://schemas.microsoft.com/office/powerpoint/2012/main">
+      <p15:sldGuideLst xmlns:p15="http://schemas.microsoft.com/office/powerpoint/2012/main" xmlns="">
         <p15:guide id="1" orient="horz" pos="2160">
           <p15:clr>
             <a:srgbClr val="A4A3A4"/>
@@ -4990,8 +4990,25 @@
             <a:pPr lvl="1"/>
             <a:r>
               <a:rPr lang="en-US" dirty="0" smtClean="0"/>
-              <a:t>Parsing K itself becomes special case: a two-level parser (OUTER, then KAST)</a:t>
-            </a:r>
+              <a:t>Parsing K itself becomes special case: a two-level parser </a:t>
+            </a:r>
+            <a:r>
+              <a:rPr lang="en-US" dirty="0" smtClean="0"/>
+              <a:t>(outer, </a:t>
+            </a:r>
+            <a:r>
+              <a:rPr lang="en-US" dirty="0" smtClean="0"/>
+              <a:t>then </a:t>
+            </a:r>
+            <a:r>
+              <a:rPr lang="en-US" dirty="0" smtClean="0"/>
+              <a:t>inner</a:t>
+            </a:r>
+            <a:r>
+              <a:rPr lang="en-US" dirty="0" smtClean="0"/>
+              <a:t>)</a:t>
+            </a:r>
+            <a:endParaRPr lang="en-US" dirty="0" smtClean="0"/>
           </a:p>
           <a:p>
             <a:r>
@@ -5976,7 +5993,11 @@
             </a:pPr>
             <a:r>
               <a:rPr lang="en-US" dirty="0" smtClean="0"/>
-              <a:t>(2) Define BUBBLE with sort </a:t>
+              <a:t>(2) Define BUBBLE with </a:t>
+            </a:r>
+            <a:r>
+              <a:rPr lang="en-US" dirty="0" smtClean="0"/>
+              <a:t>sort  </a:t>
             </a:r>
             <a:r>
               <a:rPr lang="en-US" b="1" dirty="0" smtClean="0">
@@ -5987,7 +6008,19 @@
             </a:r>
             <a:r>
               <a:rPr lang="en-US" dirty="0" smtClean="0"/>
-              <a:t> as a list of </a:t>
+              <a:t> </a:t>
+            </a:r>
+            <a:r>
+              <a:rPr lang="en-US" dirty="0" smtClean="0"/>
+              <a:t> as </a:t>
+            </a:r>
+            <a:r>
+              <a:rPr lang="en-US" dirty="0" smtClean="0"/>
+              <a:t>a list </a:t>
+            </a:r>
+            <a:r>
+              <a:rPr lang="en-US" dirty="0" smtClean="0"/>
+              <a:t>of  </a:t>
             </a:r>
             <a:r>
               <a:rPr lang="en-US" b="1" dirty="0" err="1" smtClean="0">
@@ -5998,7 +6031,15 @@
             </a:r>
             <a:r>
               <a:rPr lang="en-US" dirty="0" smtClean="0"/>
-              <a:t> elements:</a:t>
+              <a:t> </a:t>
+            </a:r>
+            <a:r>
+              <a:rPr lang="en-US" dirty="0" smtClean="0"/>
+              <a:t> elements</a:t>
+            </a:r>
+            <a:r>
+              <a:rPr lang="en-US" dirty="0" smtClean="0"/>
+              <a:t>:</a:t>
             </a:r>
           </a:p>
           <a:p>
@@ -7360,11 +7401,7 @@
           <a:p>
             <a:r>
               <a:rPr lang="en-US" dirty="0" smtClean="0"/>
-              <a:t>=   </a:t>
-            </a:r>
-            <a:r>
-              <a:rPr lang="en-US" dirty="0" smtClean="0"/>
-              <a:t>K syntax</a:t>
+              <a:t>=   K syntax</a:t>
             </a:r>
             <a:endParaRPr lang="en-US" dirty="0"/>
           </a:p>
@@ -7433,15 +7470,7 @@
           <a:p>
             <a:r>
               <a:rPr lang="en-US" dirty="0" smtClean="0"/>
-              <a:t>=   </a:t>
-            </a:r>
-            <a:r>
-              <a:rPr lang="en-US" dirty="0" smtClean="0"/>
-              <a:t>PL/library concrete</a:t>
-            </a:r>
-            <a:r>
-              <a:rPr lang="en-US" dirty="0" smtClean="0"/>
-              <a:t> syntax</a:t>
+              <a:t>=   PL/library concrete syntax</a:t>
             </a:r>
             <a:endParaRPr lang="en-US" dirty="0"/>
           </a:p>
@@ -7510,19 +7539,7 @@
           <a:p>
             <a:r>
               <a:rPr lang="en-US" dirty="0" smtClean="0"/>
-              <a:t>=   </a:t>
-            </a:r>
-            <a:r>
-              <a:rPr lang="en-US" dirty="0" smtClean="0"/>
-              <a:t>KAST (</a:t>
-            </a:r>
-            <a:r>
-              <a:rPr lang="en-US" dirty="0" smtClean="0"/>
-              <a:t>PL</a:t>
-            </a:r>
-            <a:r>
-              <a:rPr lang="en-US" dirty="0" smtClean="0"/>
-              <a:t> abstract syntax)</a:t>
+              <a:t>=   KAST (PL abstract syntax)</a:t>
             </a:r>
             <a:endParaRPr lang="en-US" dirty="0"/>
           </a:p>
@@ -8200,8 +8217,17 @@
             <a:pPr lvl="1"/>
             <a:r>
               <a:rPr lang="en-US" dirty="0" smtClean="0"/>
-              <a:t>Use fast KAST parser when bubble contains PL syntax only using KAST</a:t>
-            </a:r>
+              <a:t>Use fast KAST parser when bubble contains PL syntax </a:t>
+            </a:r>
+            <a:r>
+              <a:rPr lang="en-US" dirty="0"/>
+              <a:t>using KAST </a:t>
+            </a:r>
+            <a:r>
+              <a:rPr lang="en-US" dirty="0" smtClean="0"/>
+              <a:t>only</a:t>
+            </a:r>
+            <a:endParaRPr lang="en-US" dirty="0" smtClean="0"/>
           </a:p>
           <a:p>
             <a:pPr lvl="1"/>
@@ -13860,7 +13886,7 @@
   <a:extraClrSchemeLst/>
   <a:extLst>
     <a:ext uri="{05A4C25C-085E-4340-85A3-A5531E510DB2}">
-      <thm15:themeFamily xmlns:thm15="http://schemas.microsoft.com/office/thememl/2012/main" name="Office Theme" id="{62F939B6-93AF-4DB8-9C6B-D6C7DFDC589F}" vid="{4A3C46E8-61CC-4603-A589-7422A47A8E4A}"/>
+      <thm15:themeFamily xmlns:thm15="http://schemas.microsoft.com/office/thememl/2012/main" xmlns="" name="Office Theme" id="{62F939B6-93AF-4DB8-9C6B-D6C7DFDC589F}" vid="{4A3C46E8-61CC-4603-A589-7422A47A8E4A}"/>
     </a:ext>
   </a:extLst>
 </a:theme>
@@ -14121,7 +14147,7 @@
   <a:extraClrSchemeLst/>
   <a:extLst>
     <a:ext uri="{05A4C25C-085E-4340-85A3-A5531E510DB2}">
-      <thm15:themeFamily xmlns:thm15="http://schemas.microsoft.com/office/thememl/2012/main" name="Office Theme" id="{62F939B6-93AF-4DB8-9C6B-D6C7DFDC589F}" vid="{4A3C46E8-61CC-4603-A589-7422A47A8E4A}"/>
+      <thm15:themeFamily xmlns:thm15="http://schemas.microsoft.com/office/thememl/2012/main" xmlns="" name="Office Theme" id="{62F939B6-93AF-4DB8-9C6B-D6C7DFDC589F}" vid="{4A3C46E8-61CC-4603-A589-7422A47A8E4A}"/>
     </a:ext>
   </a:extLst>
 </a:theme>

</xml_diff>

<commit_message>
final polish of parsers.pptx
</commit_message>
<xml_diff>
--- a/samples/kast/parsers.pptx
+++ b/samples/kast/parsers.pptx
@@ -226,7 +226,7 @@
           <a:p>
             <a:fld id="{9EDAC3E4-DDEC-4AA1-9D06-431410F99890}" type="datetimeFigureOut">
               <a:rPr lang="en-US" smtClean="0"/>
-              <a:t>8/29/2014</a:t>
+              <a:t>8/31/2014</a:t>
             </a:fld>
             <a:endParaRPr lang="en-US"/>
           </a:p>
@@ -559,6 +559,90 @@
           <a:p>
             <a:fld id="{3DE1A622-C420-4E45-863D-B0D661AB9A22}" type="slidenum">
               <a:rPr lang="en-US" smtClean="0"/>
+              <a:t>5</a:t>
+            </a:fld>
+            <a:endParaRPr lang="en-US"/>
+          </a:p>
+        </p:txBody>
+      </p:sp>
+    </p:spTree>
+    <p:extLst>
+      <p:ext uri="{BB962C8B-B14F-4D97-AF65-F5344CB8AC3E}">
+        <p14:creationId xmlns:p14="http://schemas.microsoft.com/office/powerpoint/2010/main" val="253170301"/>
+      </p:ext>
+    </p:extLst>
+  </p:cSld>
+  <p:clrMapOvr>
+    <a:masterClrMapping/>
+  </p:clrMapOvr>
+</p:notes>
+</file>
+
+<file path=ppt/notesSlides/notesSlide2.xml><?xml version="1.0" encoding="utf-8"?>
+<p:notes xmlns:a="http://schemas.openxmlformats.org/drawingml/2006/main" xmlns:r="http://schemas.openxmlformats.org/officeDocument/2006/relationships" xmlns:p="http://schemas.openxmlformats.org/presentationml/2006/main">
+  <p:cSld>
+    <p:spTree>
+      <p:nvGrpSpPr>
+        <p:cNvPr id="1" name=""/>
+        <p:cNvGrpSpPr/>
+        <p:nvPr/>
+      </p:nvGrpSpPr>
+      <p:grpSpPr>
+        <a:xfrm>
+          <a:off x="0" y="0"/>
+          <a:ext cx="0" cy="0"/>
+          <a:chOff x="0" y="0"/>
+          <a:chExt cx="0" cy="0"/>
+        </a:xfrm>
+      </p:grpSpPr>
+      <p:sp>
+        <p:nvSpPr>
+          <p:cNvPr id="2" name="Slide Image Placeholder 1"/>
+          <p:cNvSpPr>
+            <a:spLocks noGrp="1" noRot="1" noChangeAspect="1"/>
+          </p:cNvSpPr>
+          <p:nvPr>
+            <p:ph type="sldImg"/>
+          </p:nvPr>
+        </p:nvSpPr>
+        <p:spPr/>
+      </p:sp>
+      <p:sp>
+        <p:nvSpPr>
+          <p:cNvPr id="3" name="Notes Placeholder 2"/>
+          <p:cNvSpPr>
+            <a:spLocks noGrp="1"/>
+          </p:cNvSpPr>
+          <p:nvPr>
+            <p:ph type="body" idx="1"/>
+          </p:nvPr>
+        </p:nvSpPr>
+        <p:spPr/>
+        <p:txBody>
+          <a:bodyPr/>
+          <a:lstStyle/>
+          <a:p>
+            <a:endParaRPr lang="en-US" dirty="0"/>
+          </a:p>
+        </p:txBody>
+      </p:sp>
+      <p:sp>
+        <p:nvSpPr>
+          <p:cNvPr id="4" name="Slide Number Placeholder 3"/>
+          <p:cNvSpPr>
+            <a:spLocks noGrp="1"/>
+          </p:cNvSpPr>
+          <p:nvPr>
+            <p:ph type="sldNum" sz="quarter" idx="10"/>
+          </p:nvPr>
+        </p:nvSpPr>
+        <p:spPr/>
+        <p:txBody>
+          <a:bodyPr/>
+          <a:lstStyle/>
+          <a:p>
+            <a:fld id="{3DE1A622-C420-4E45-863D-B0D661AB9A22}" type="slidenum">
+              <a:rPr lang="en-US" smtClean="0"/>
               <a:t>9</a:t>
             </a:fld>
             <a:endParaRPr lang="en-US"/>
@@ -578,7 +662,7 @@
 </p:notes>
 </file>
 
-<file path=ppt/notesSlides/notesSlide2.xml><?xml version="1.0" encoding="utf-8"?>
+<file path=ppt/notesSlides/notesSlide3.xml><?xml version="1.0" encoding="utf-8"?>
 <p:notes xmlns:a="http://schemas.openxmlformats.org/drawingml/2006/main" xmlns:r="http://schemas.openxmlformats.org/officeDocument/2006/relationships" xmlns:p="http://schemas.openxmlformats.org/presentationml/2006/main">
   <p:cSld>
     <p:spTree>
@@ -793,7 +877,7 @@
           <a:p>
             <a:fld id="{0FFA976D-51B1-4925-B118-D9D2C7D231FA}" type="datetimeFigureOut">
               <a:rPr lang="en-US" smtClean="0"/>
-              <a:t>8/29/2014</a:t>
+              <a:t>8/31/2014</a:t>
             </a:fld>
             <a:endParaRPr lang="en-US"/>
           </a:p>
@@ -963,7 +1047,7 @@
           <a:p>
             <a:fld id="{0FFA976D-51B1-4925-B118-D9D2C7D231FA}" type="datetimeFigureOut">
               <a:rPr lang="en-US" smtClean="0"/>
-              <a:t>8/29/2014</a:t>
+              <a:t>8/31/2014</a:t>
             </a:fld>
             <a:endParaRPr lang="en-US"/>
           </a:p>
@@ -1143,7 +1227,7 @@
           <a:p>
             <a:fld id="{0FFA976D-51B1-4925-B118-D9D2C7D231FA}" type="datetimeFigureOut">
               <a:rPr lang="en-US" smtClean="0"/>
-              <a:t>8/29/2014</a:t>
+              <a:t>8/31/2014</a:t>
             </a:fld>
             <a:endParaRPr lang="en-US"/>
           </a:p>
@@ -1313,7 +1397,7 @@
           <a:p>
             <a:fld id="{0FFA976D-51B1-4925-B118-D9D2C7D231FA}" type="datetimeFigureOut">
               <a:rPr lang="en-US" smtClean="0"/>
-              <a:t>8/29/2014</a:t>
+              <a:t>8/31/2014</a:t>
             </a:fld>
             <a:endParaRPr lang="en-US"/>
           </a:p>
@@ -1559,7 +1643,7 @@
           <a:p>
             <a:fld id="{0FFA976D-51B1-4925-B118-D9D2C7D231FA}" type="datetimeFigureOut">
               <a:rPr lang="en-US" smtClean="0"/>
-              <a:t>8/29/2014</a:t>
+              <a:t>8/31/2014</a:t>
             </a:fld>
             <a:endParaRPr lang="en-US"/>
           </a:p>
@@ -1791,7 +1875,7 @@
           <a:p>
             <a:fld id="{0FFA976D-51B1-4925-B118-D9D2C7D231FA}" type="datetimeFigureOut">
               <a:rPr lang="en-US" smtClean="0"/>
-              <a:t>8/29/2014</a:t>
+              <a:t>8/31/2014</a:t>
             </a:fld>
             <a:endParaRPr lang="en-US"/>
           </a:p>
@@ -2158,7 +2242,7 @@
           <a:p>
             <a:fld id="{0FFA976D-51B1-4925-B118-D9D2C7D231FA}" type="datetimeFigureOut">
               <a:rPr lang="en-US" smtClean="0"/>
-              <a:t>8/29/2014</a:t>
+              <a:t>8/31/2014</a:t>
             </a:fld>
             <a:endParaRPr lang="en-US"/>
           </a:p>
@@ -2276,7 +2360,7 @@
           <a:p>
             <a:fld id="{0FFA976D-51B1-4925-B118-D9D2C7D231FA}" type="datetimeFigureOut">
               <a:rPr lang="en-US" smtClean="0"/>
-              <a:t>8/29/2014</a:t>
+              <a:t>8/31/2014</a:t>
             </a:fld>
             <a:endParaRPr lang="en-US"/>
           </a:p>
@@ -2371,7 +2455,7 @@
           <a:p>
             <a:fld id="{0FFA976D-51B1-4925-B118-D9D2C7D231FA}" type="datetimeFigureOut">
               <a:rPr lang="en-US" smtClean="0"/>
-              <a:t>8/29/2014</a:t>
+              <a:t>8/31/2014</a:t>
             </a:fld>
             <a:endParaRPr lang="en-US"/>
           </a:p>
@@ -2648,7 +2732,7 @@
           <a:p>
             <a:fld id="{0FFA976D-51B1-4925-B118-D9D2C7D231FA}" type="datetimeFigureOut">
               <a:rPr lang="en-US" smtClean="0"/>
-              <a:t>8/29/2014</a:t>
+              <a:t>8/31/2014</a:t>
             </a:fld>
             <a:endParaRPr lang="en-US"/>
           </a:p>
@@ -2901,7 +2985,7 @@
           <a:p>
             <a:fld id="{0FFA976D-51B1-4925-B118-D9D2C7D231FA}" type="datetimeFigureOut">
               <a:rPr lang="en-US" smtClean="0"/>
-              <a:t>8/29/2014</a:t>
+              <a:t>8/31/2014</a:t>
             </a:fld>
             <a:endParaRPr lang="en-US"/>
           </a:p>
@@ -3114,7 +3198,7 @@
           <a:p>
             <a:fld id="{0FFA976D-51B1-4925-B118-D9D2C7D231FA}" type="datetimeFigureOut">
               <a:rPr lang="en-US" smtClean="0"/>
-              <a:t>8/29/2014</a:t>
+              <a:t>8/31/2014</a:t>
             </a:fld>
             <a:endParaRPr lang="en-US"/>
           </a:p>
@@ -8189,7 +8273,11 @@
           </a:p>
           <a:p>
             <a:r>
-              <a:rPr lang="en-US" dirty="0" smtClean="0"/>
+              <a:rPr lang="en-US" dirty="0" smtClean="0">
+                <a:solidFill>
+                  <a:srgbClr val="FF0000"/>
+                </a:solidFill>
+              </a:rPr>
               <a:t>Two simple extensions needed:</a:t>
             </a:r>
           </a:p>
@@ -8197,13 +8285,20 @@
             <a:pPr lvl="1"/>
             <a:r>
               <a:rPr lang="en-US" b="1" dirty="0" smtClean="0">
+                <a:solidFill>
+                  <a:srgbClr val="FF0000"/>
+                </a:solidFill>
                 <a:latin typeface="Courier New" panose="02070309020205020404" pitchFamily="49" charset="0"/>
                 <a:cs typeface="Courier New" panose="02070309020205020404" pitchFamily="49" charset="0"/>
               </a:rPr>
               <a:t>[token] </a:t>
             </a:r>
             <a:r>
-              <a:rPr lang="en-US" dirty="0" smtClean="0"/>
+              <a:rPr lang="en-US" dirty="0" smtClean="0">
+                <a:solidFill>
+                  <a:srgbClr val="FF0000"/>
+                </a:solidFill>
+              </a:rPr>
               <a:t>attribute to productions, to save the parsed substring as a token</a:t>
             </a:r>
           </a:p>
@@ -8211,13 +8306,20 @@
             <a:pPr lvl="1"/>
             <a:r>
               <a:rPr lang="en-US" b="1" dirty="0" smtClean="0">
+                <a:solidFill>
+                  <a:srgbClr val="FF0000"/>
+                </a:solidFill>
                 <a:latin typeface="Courier New" panose="02070309020205020404" pitchFamily="49" charset="0"/>
                 <a:cs typeface="Courier New" panose="02070309020205020404" pitchFamily="49" charset="0"/>
               </a:rPr>
               <a:t>#parse </a:t>
             </a:r>
             <a:r>
-              <a:rPr lang="en-US" dirty="0" smtClean="0"/>
+              <a:rPr lang="en-US" dirty="0" smtClean="0">
+                <a:solidFill>
+                  <a:srgbClr val="FF0000"/>
+                </a:solidFill>
+              </a:rPr>
               <a:t>to take a module as well, besides a string and a sort, as argument</a:t>
             </a:r>
           </a:p>
@@ -9740,23 +9842,7 @@
           <a:p>
             <a:r>
               <a:rPr lang="en-US" dirty="0" smtClean="0"/>
-              <a:t>Example </a:t>
-            </a:r>
-            <a:r>
-              <a:rPr lang="en-US" dirty="0" smtClean="0"/>
-              <a:t>2: </a:t>
-            </a:r>
-            <a:r>
-              <a:rPr lang="en-US" dirty="0" smtClean="0"/>
-              <a:t>Global </a:t>
-            </a:r>
-            <a:r>
-              <a:rPr lang="en-US" dirty="0" smtClean="0"/>
-              <a:t>K </a:t>
-            </a:r>
-            <a:r>
-              <a:rPr lang="en-US" dirty="0" smtClean="0"/>
-              <a:t>Parsing in K</a:t>
+              <a:t>Example 2: Global K Parsing in K</a:t>
             </a:r>
             <a:endParaRPr lang="en-US" dirty="0"/>
           </a:p>
@@ -9797,11 +9883,7 @@
             </a:r>
             <a:r>
               <a:rPr lang="en-US" dirty="0" smtClean="0"/>
-              <a:t>BUBBLE, and OUTER_WITH_BUBBLES </a:t>
-            </a:r>
-            <a:r>
-              <a:rPr lang="en-US" dirty="0" smtClean="0"/>
-              <a:t>like before</a:t>
+              <a:t>BUBBLE, and OUTER_WITH_BUBBLES like before</a:t>
             </a:r>
           </a:p>
           <a:p>
@@ -9864,30 +9946,16 @@
                 <a:latin typeface="Courier New" panose="02070309020205020404" pitchFamily="49" charset="0"/>
                 <a:cs typeface="Courier New" panose="02070309020205020404" pitchFamily="49" charset="0"/>
               </a:rPr>
-              <a:t>module </a:t>
-            </a:r>
-            <a:r>
-              <a:rPr lang="en-US" b="1" dirty="0" smtClean="0">
-                <a:latin typeface="Courier New" panose="02070309020205020404" pitchFamily="49" charset="0"/>
-                <a:cs typeface="Courier New" panose="02070309020205020404" pitchFamily="49" charset="0"/>
-              </a:rPr>
-              <a:t>OUTER_WITH_K</a:t>
-            </a:r>
-          </a:p>
-          <a:p>
-            <a:r>
-              <a:rPr lang="en-US" b="1" dirty="0" smtClean="0">
-                <a:latin typeface="Courier New" panose="02070309020205020404" pitchFamily="49" charset="0"/>
-                <a:cs typeface="Courier New" panose="02070309020205020404" pitchFamily="49" charset="0"/>
-              </a:rPr>
-              <a:t>  </a:t>
-            </a:r>
-            <a:r>
-              <a:rPr lang="en-US" b="1" dirty="0" smtClean="0">
-                <a:latin typeface="Courier New" panose="02070309020205020404" pitchFamily="49" charset="0"/>
-                <a:cs typeface="Courier New" panose="02070309020205020404" pitchFamily="49" charset="0"/>
-              </a:rPr>
-              <a:t>imports OUTER</a:t>
+              <a:t>module OUTER_WITH_K</a:t>
+            </a:r>
+          </a:p>
+          <a:p>
+            <a:r>
+              <a:rPr lang="en-US" b="1" dirty="0" smtClean="0">
+                <a:latin typeface="Courier New" panose="02070309020205020404" pitchFamily="49" charset="0"/>
+                <a:cs typeface="Courier New" panose="02070309020205020404" pitchFamily="49" charset="0"/>
+              </a:rPr>
+              <a:t>  imports OUTER</a:t>
             </a:r>
           </a:p>
           <a:p>
@@ -10043,17 +10111,7 @@
                 <a:latin typeface="Courier New" panose="02070309020205020404" pitchFamily="49" charset="0"/>
                 <a:cs typeface="Courier New" panose="02070309020205020404" pitchFamily="49" charset="0"/>
               </a:rPr>
-              <a:t>“</a:t>
-            </a:r>
-            <a:r>
-              <a:rPr lang="en-US" b="1" dirty="0" smtClean="0">
-                <a:solidFill>
-                  <a:srgbClr val="FF0000"/>
-                </a:solidFill>
-                <a:latin typeface="Courier New" panose="02070309020205020404" pitchFamily="49" charset="0"/>
-                <a:cs typeface="Courier New" panose="02070309020205020404" pitchFamily="49" charset="0"/>
-              </a:rPr>
-              <a:t>KAST + LANG-SYNTAX”</a:t>
+              <a:t>“KAST + LANG-SYNTAX”</a:t>
             </a:r>
             <a:r>
               <a:rPr lang="en-US" b="1" dirty="0" smtClean="0">
@@ -10062,10 +10120,6 @@
               </a:rPr>
               <a:t>)</a:t>
             </a:r>
-            <a:endParaRPr lang="en-US" b="1" dirty="0" smtClean="0">
-              <a:latin typeface="Courier New" panose="02070309020205020404" pitchFamily="49" charset="0"/>
-              <a:cs typeface="Courier New" panose="02070309020205020404" pitchFamily="49" charset="0"/>
-            </a:endParaRPr>
           </a:p>
           <a:p>
             <a:endParaRPr lang="en-US" b="1" dirty="0" smtClean="0">
@@ -11903,8 +11957,13 @@
             <a:pPr lvl="1"/>
             <a:r>
               <a:rPr lang="en-US" dirty="0" smtClean="0"/>
-              <a:t>PL syntax can only appear in bubbles now</a:t>
-            </a:r>
+              <a:t>PL syntax can only appear in bubbles </a:t>
+            </a:r>
+            <a:r>
+              <a:rPr lang="en-US" dirty="0" smtClean="0"/>
+              <a:t>now</a:t>
+            </a:r>
+            <a:endParaRPr lang="en-US" dirty="0" smtClean="0"/>
           </a:p>
           <a:p>
             <a:pPr marL="514350" indent="-514350">
@@ -12520,7 +12579,7 @@
         <p:spPr>
           <a:xfrm>
             <a:off x="7284203" y="1542089"/>
-            <a:ext cx="4711485" cy="4032091"/>
+            <a:ext cx="4711485" cy="3557945"/>
           </a:xfrm>
           <a:prstGeom prst="flowChartDocument">
             <a:avLst/>
@@ -12654,11 +12713,7 @@
           <a:p>
             <a:r>
               <a:rPr lang="en-US" dirty="0" smtClean="0"/>
-              <a:t>=   </a:t>
-            </a:r>
-            <a:r>
-              <a:rPr lang="en-US" dirty="0" smtClean="0"/>
-              <a:t>Outer syntax</a:t>
+              <a:t>=   Outer syntax</a:t>
             </a:r>
             <a:endParaRPr lang="en-US" dirty="0"/>
           </a:p>
@@ -12688,11 +12743,7 @@
           <a:p>
             <a:r>
               <a:rPr lang="en-US" dirty="0" smtClean="0"/>
-              <a:t>=   </a:t>
-            </a:r>
-            <a:r>
-              <a:rPr lang="en-US" dirty="0" smtClean="0"/>
-              <a:t>Inner syntax, parsed by the</a:t>
+              <a:t>=   Inner syntax, parsed by the</a:t>
             </a:r>
           </a:p>
           <a:p>
@@ -12702,11 +12753,7 @@
             </a:r>
             <a:r>
               <a:rPr lang="en-US" dirty="0" smtClean="0"/>
-              <a:t>    </a:t>
-            </a:r>
-            <a:r>
-              <a:rPr lang="en-US" dirty="0" smtClean="0"/>
-              <a:t>outer syntax parser as a</a:t>
+              <a:t>    outer syntax parser as a</a:t>
             </a:r>
           </a:p>
           <a:p>
@@ -13285,28 +13332,7 @@
                 <a:latin typeface="Courier New" panose="02070309020205020404" pitchFamily="49" charset="0"/>
                 <a:cs typeface="Courier New" panose="02070309020205020404" pitchFamily="49" charset="0"/>
               </a:rPr>
-              <a:t>  rule </a:t>
-            </a:r>
-            <a:r>
-              <a:rPr lang="en-US" b="1" dirty="0" smtClean="0">
-                <a:latin typeface="Courier New" panose="02070309020205020404" pitchFamily="49" charset="0"/>
-                <a:cs typeface="Courier New" panose="02070309020205020404" pitchFamily="49" charset="0"/>
-              </a:rPr>
-              <a:t>`_/_`(I1:Int,I2:Int) </a:t>
-            </a:r>
-            <a:r>
-              <a:rPr lang="en-US" b="1" dirty="0" smtClean="0">
-                <a:latin typeface="Courier New" panose="02070309020205020404" pitchFamily="49" charset="0"/>
-                <a:cs typeface="Courier New" panose="02070309020205020404" pitchFamily="49" charset="0"/>
-              </a:rPr>
-              <a:t>=&gt; </a:t>
-            </a:r>
-            <a:r>
-              <a:rPr lang="en-US" b="1" dirty="0" smtClean="0">
-                <a:latin typeface="Courier New" panose="02070309020205020404" pitchFamily="49" charset="0"/>
-                <a:cs typeface="Courier New" panose="02070309020205020404" pitchFamily="49" charset="0"/>
-              </a:rPr>
-              <a:t>`_\</a:t>
+              <a:t>  rule `_/_`(I1:Int,I2:Int) =&gt; `_\</a:t>
             </a:r>
             <a:r>
               <a:rPr lang="en-US" b="1" dirty="0" err="1" smtClean="0">
@@ -13322,10 +13348,6 @@
               </a:rPr>
               <a:t>_`(I1,I2)</a:t>
             </a:r>
-            <a:endParaRPr lang="en-US" b="1" dirty="0" smtClean="0">
-              <a:latin typeface="Courier New" panose="02070309020205020404" pitchFamily="49" charset="0"/>
-              <a:cs typeface="Courier New" panose="02070309020205020404" pitchFamily="49" charset="0"/>
-            </a:endParaRPr>
           </a:p>
           <a:p>
             <a:r>
@@ -13340,14 +13362,7 @@
                 <a:latin typeface="Courier New" panose="02070309020205020404" pitchFamily="49" charset="0"/>
                 <a:cs typeface="Courier New" panose="02070309020205020404" pitchFamily="49" charset="0"/>
               </a:rPr>
-              <a:t>   requires </a:t>
-            </a:r>
-            <a:r>
-              <a:rPr lang="en-US" b="1" dirty="0" smtClean="0">
-                <a:latin typeface="Courier New" panose="02070309020205020404" pitchFamily="49" charset="0"/>
-                <a:cs typeface="Courier New" panose="02070309020205020404" pitchFamily="49" charset="0"/>
-              </a:rPr>
-              <a:t>`_=/=</a:t>
+              <a:t>   requires `_=/=</a:t>
             </a:r>
             <a:r>
               <a:rPr lang="en-US" b="1" dirty="0" err="1" smtClean="0">
@@ -13361,19 +13376,8 @@
                 <a:latin typeface="Courier New" panose="02070309020205020404" pitchFamily="49" charset="0"/>
                 <a:cs typeface="Courier New" panose="02070309020205020404" pitchFamily="49" charset="0"/>
               </a:rPr>
-              <a:t>(</a:t>
-            </a:r>
-            <a:r>
-              <a:rPr lang="en-US" b="1" dirty="0" smtClean="0">
-                <a:latin typeface="Courier New" panose="02070309020205020404" pitchFamily="49" charset="0"/>
-                <a:cs typeface="Courier New" panose="02070309020205020404" pitchFamily="49" charset="0"/>
-              </a:rPr>
-              <a:t>I1,0)</a:t>
-            </a:r>
-            <a:endParaRPr lang="en-US" b="1" dirty="0" smtClean="0">
-              <a:latin typeface="Courier New" panose="02070309020205020404" pitchFamily="49" charset="0"/>
-              <a:cs typeface="Courier New" panose="02070309020205020404" pitchFamily="49" charset="0"/>
-            </a:endParaRPr>
+              <a:t>(I1,0)</a:t>
+            </a:r>
           </a:p>
           <a:p>
             <a:r>
@@ -13388,28 +13392,7 @@
                 <a:latin typeface="Courier New" panose="02070309020205020404" pitchFamily="49" charset="0"/>
                 <a:cs typeface="Courier New" panose="02070309020205020404" pitchFamily="49" charset="0"/>
               </a:rPr>
-              <a:t> rule &lt;k&gt; `_=&gt;_`( </a:t>
-            </a:r>
-            <a:r>
-              <a:rPr lang="en-US" b="1" dirty="0" smtClean="0">
-                <a:latin typeface="Courier New" panose="02070309020205020404" pitchFamily="49" charset="0"/>
-                <a:cs typeface="Courier New" panose="02070309020205020404" pitchFamily="49" charset="0"/>
-              </a:rPr>
-              <a:t>I:Int,X:Var </a:t>
-            </a:r>
-            <a:r>
-              <a:rPr lang="en-US" b="1" dirty="0" smtClean="0">
-                <a:latin typeface="Courier New" panose="02070309020205020404" pitchFamily="49" charset="0"/>
-                <a:cs typeface="Courier New" panose="02070309020205020404" pitchFamily="49" charset="0"/>
-              </a:rPr>
-              <a:t>) =&gt; </a:t>
-            </a:r>
-            <a:r>
-              <a:rPr lang="en-US" b="1" dirty="0" smtClean="0">
-                <a:latin typeface="Courier New" panose="02070309020205020404" pitchFamily="49" charset="0"/>
-                <a:cs typeface="Courier New" panose="02070309020205020404" pitchFamily="49" charset="0"/>
-              </a:rPr>
-              <a:t>`skip`(.::</a:t>
+              <a:t> rule &lt;k&gt; `_=&gt;_`( I:Int,X:Var ) =&gt; `skip`(.::</a:t>
             </a:r>
             <a:r>
               <a:rPr lang="en-US" b="1" dirty="0" err="1" smtClean="0">
@@ -13423,14 +13406,7 @@
                 <a:latin typeface="Courier New" panose="02070309020205020404" pitchFamily="49" charset="0"/>
                 <a:cs typeface="Courier New" panose="02070309020205020404" pitchFamily="49" charset="0"/>
               </a:rPr>
-              <a:t>) </a:t>
-            </a:r>
-            <a:r>
-              <a:rPr lang="en-US" b="1" dirty="0" smtClean="0">
-                <a:latin typeface="Courier New" panose="02070309020205020404" pitchFamily="49" charset="0"/>
-                <a:cs typeface="Courier New" panose="02070309020205020404" pitchFamily="49" charset="0"/>
-              </a:rPr>
-              <a:t>…&lt;/k&gt;</a:t>
+              <a:t>) …&lt;/k&gt;</a:t>
             </a:r>
           </a:p>
           <a:p>
@@ -13446,35 +13422,7 @@
                 <a:latin typeface="Courier New" panose="02070309020205020404" pitchFamily="49" charset="0"/>
                 <a:cs typeface="Courier New" panose="02070309020205020404" pitchFamily="49" charset="0"/>
               </a:rPr>
-              <a:t>      &lt;state&gt;… </a:t>
-            </a:r>
-            <a:r>
-              <a:rPr lang="en-US" b="1" dirty="0" smtClean="0">
-                <a:latin typeface="Courier New" panose="02070309020205020404" pitchFamily="49" charset="0"/>
-                <a:cs typeface="Courier New" panose="02070309020205020404" pitchFamily="49" charset="0"/>
-              </a:rPr>
-              <a:t>`_|-&gt;_`(X,`_ </a:t>
-            </a:r>
-            <a:r>
-              <a:rPr lang="en-US" b="1" dirty="0" smtClean="0">
-                <a:latin typeface="Courier New" panose="02070309020205020404" pitchFamily="49" charset="0"/>
-                <a:cs typeface="Courier New" panose="02070309020205020404" pitchFamily="49" charset="0"/>
-              </a:rPr>
-              <a:t>=&gt; I</a:t>
-            </a:r>
-            <a:r>
-              <a:rPr lang="en-US" b="1" dirty="0" smtClean="0">
-                <a:latin typeface="Courier New" panose="02070309020205020404" pitchFamily="49" charset="0"/>
-                <a:cs typeface="Courier New" panose="02070309020205020404" pitchFamily="49" charset="0"/>
-              </a:rPr>
-              <a:t>`) </a:t>
-            </a:r>
-            <a:r>
-              <a:rPr lang="en-US" b="1" dirty="0" smtClean="0">
-                <a:latin typeface="Courier New" panose="02070309020205020404" pitchFamily="49" charset="0"/>
-                <a:cs typeface="Courier New" panose="02070309020205020404" pitchFamily="49" charset="0"/>
-              </a:rPr>
-              <a:t>…&lt;/state&gt;</a:t>
+              <a:t>      &lt;state&gt;… `_|-&gt;_`(X,`_ =&gt; I`) …&lt;/state&gt;</a:t>
             </a:r>
           </a:p>
           <a:p>
@@ -13731,11 +13679,7 @@
           <a:p>
             <a:r>
               <a:rPr lang="en-US" dirty="0" smtClean="0"/>
-              <a:t>=   </a:t>
-            </a:r>
-            <a:r>
-              <a:rPr lang="en-US" dirty="0" smtClean="0"/>
-              <a:t>Outer syntax</a:t>
+              <a:t>=   Outer syntax</a:t>
             </a:r>
             <a:endParaRPr lang="en-US" dirty="0"/>
           </a:p>
@@ -13765,11 +13709,7 @@
           <a:p>
             <a:r>
               <a:rPr lang="en-US" dirty="0" smtClean="0"/>
-              <a:t>=   </a:t>
-            </a:r>
-            <a:r>
-              <a:rPr lang="en-US" dirty="0" smtClean="0"/>
-              <a:t>Inner syntax, parsed by the</a:t>
+              <a:t>=   Inner syntax, parsed by the</a:t>
             </a:r>
           </a:p>
           <a:p>
@@ -13779,11 +13719,7 @@
             </a:r>
             <a:r>
               <a:rPr lang="en-US" dirty="0" smtClean="0"/>
-              <a:t>    </a:t>
-            </a:r>
-            <a:r>
-              <a:rPr lang="en-US" dirty="0" smtClean="0"/>
-              <a:t>outer syntax parser as a</a:t>
+              <a:t>    outer syntax parser as a</a:t>
             </a:r>
           </a:p>
           <a:p>

</xml_diff>